<commit_message>
Clase 6 - correcciones
</commit_message>
<xml_diff>
--- a/Clase 6 - Modificadores de acceso/Clase 6 Modificadores de acceso (Presentacion).pptx
+++ b/Clase 6 - Modificadores de acceso/Clase 6 Modificadores de acceso (Presentacion).pptx
@@ -152,15 +152,65 @@
       </a:defRPr>
     </a:lvl9pPr>
   </p:defaultTextStyle>
+  <p:extLst>
+    <p:ext uri="{EFAFB233-063F-42B5-8137-9DF3F51BA10A}">
+      <p15:sldGuideLst xmlns:p15="http://schemas.microsoft.com/office/powerpoint/2012/main"/>
+    </p:ext>
+  </p:extLst>
 </p:presentation>
 </file>
 
 <file path=ppt/revisionInfo.xml><?xml version="1.0" encoding="utf-8"?>
 <p1510:revInfo xmlns:a="http://schemas.openxmlformats.org/drawingml/2006/main" xmlns:r="http://schemas.openxmlformats.org/officeDocument/2006/relationships" xmlns:p1510="http://schemas.microsoft.com/office/powerpoint/2015/10/main">
   <p1510:revLst>
-    <p1510:client id="{0EEAD717-0E4E-4040-9F75-7CB1F9103748}" v="83" dt="2024-04-14T03:31:32.520"/>
+    <p1510:client id="{8937566D-E4C3-48F8-8D89-5307AE8D30AE}" v="1" dt="2024-04-16T17:58:10.745"/>
   </p1510:revLst>
 </p1510:revInfo>
+</file>
+
+<file path=ppt/changesInfos/changesInfo1.xml><?xml version="1.0" encoding="utf-8"?>
+<pc:chgInfo xmlns:a="http://schemas.openxmlformats.org/drawingml/2006/main" xmlns:r="http://schemas.openxmlformats.org/officeDocument/2006/relationships" xmlns:ac="http://schemas.microsoft.com/office/drawing/2013/main/command" xmlns:pc="http://schemas.microsoft.com/office/powerpoint/2013/main/command">
+  <pc:docChgLst>
+    <pc:chgData name="OMAR MONTOYA" userId="72fefa31c3f9e9f9" providerId="LiveId" clId="{8937566D-E4C3-48F8-8D89-5307AE8D30AE}"/>
+    <pc:docChg chg="custSel modSld">
+      <pc:chgData name="OMAR MONTOYA" userId="72fefa31c3f9e9f9" providerId="LiveId" clId="{8937566D-E4C3-48F8-8D89-5307AE8D30AE}" dt="2024-04-16T17:58:28.337" v="6" actId="1076"/>
+      <pc:docMkLst>
+        <pc:docMk/>
+      </pc:docMkLst>
+      <pc:sldChg chg="addSp delSp modSp mod">
+        <pc:chgData name="OMAR MONTOYA" userId="72fefa31c3f9e9f9" providerId="LiveId" clId="{8937566D-E4C3-48F8-8D89-5307AE8D30AE}" dt="2024-04-16T17:58:28.337" v="6" actId="1076"/>
+        <pc:sldMkLst>
+          <pc:docMk/>
+          <pc:sldMk cId="1246407245" sldId="263"/>
+        </pc:sldMkLst>
+        <pc:spChg chg="del">
+          <ac:chgData name="OMAR MONTOYA" userId="72fefa31c3f9e9f9" providerId="LiveId" clId="{8937566D-E4C3-48F8-8D89-5307AE8D30AE}" dt="2024-04-16T17:57:20.551" v="1" actId="478"/>
+          <ac:spMkLst>
+            <pc:docMk/>
+            <pc:sldMk cId="1246407245" sldId="263"/>
+            <ac:spMk id="5" creationId="{CD88966B-AF32-8B4D-A443-E14F789ABB47}"/>
+          </ac:spMkLst>
+        </pc:spChg>
+        <pc:picChg chg="del">
+          <ac:chgData name="OMAR MONTOYA" userId="72fefa31c3f9e9f9" providerId="LiveId" clId="{8937566D-E4C3-48F8-8D89-5307AE8D30AE}" dt="2024-04-16T17:57:18.101" v="0" actId="478"/>
+          <ac:picMkLst>
+            <pc:docMk/>
+            <pc:sldMk cId="1246407245" sldId="263"/>
+            <ac:picMk id="4" creationId="{2DB4A7E4-D738-8D4B-DDCC-09E5EC79FE0A}"/>
+          </ac:picMkLst>
+        </pc:picChg>
+        <pc:picChg chg="add mod">
+          <ac:chgData name="OMAR MONTOYA" userId="72fefa31c3f9e9f9" providerId="LiveId" clId="{8937566D-E4C3-48F8-8D89-5307AE8D30AE}" dt="2024-04-16T17:58:28.337" v="6" actId="1076"/>
+          <ac:picMkLst>
+            <pc:docMk/>
+            <pc:sldMk cId="1246407245" sldId="263"/>
+            <ac:picMk id="6" creationId="{8B0B03D2-BA93-47DF-FE77-CDB996E1B333}"/>
+          </ac:picMkLst>
+        </pc:picChg>
+      </pc:sldChg>
+    </pc:docChg>
+  </pc:docChgLst>
+</pc:chgInfo>
 </file>
 
 <file path=ppt/notesMasters/notesMaster1.xml><?xml version="1.0" encoding="utf-8"?>
@@ -245,7 +295,7 @@
           <a:p>
             <a:fld id="{30DC8F74-F899-4DE4-9932-4289BF524A9E}" type="datetimeFigureOut">
               <a:rPr lang="es-PA" smtClean="0"/>
-              <a:t>04/13/2024</a:t>
+              <a:t>04/16/2024</a:t>
             </a:fld>
             <a:endParaRPr lang="es-PA" dirty="0"/>
           </a:p>
@@ -5300,7 +5350,7 @@
           <a:p>
             <a:fld id="{1A88BB4D-1961-40E1-9ABD-99BD09E9F411}" type="datetimeFigureOut">
               <a:rPr lang="es-PA" smtClean="0"/>
-              <a:t>04/13/2024</a:t>
+              <a:t>04/16/2024</a:t>
             </a:fld>
             <a:endParaRPr lang="es-PA" dirty="0"/>
           </a:p>
@@ -5500,7 +5550,7 @@
           <a:p>
             <a:fld id="{1A88BB4D-1961-40E1-9ABD-99BD09E9F411}" type="datetimeFigureOut">
               <a:rPr lang="es-PA" smtClean="0"/>
-              <a:t>04/13/2024</a:t>
+              <a:t>04/16/2024</a:t>
             </a:fld>
             <a:endParaRPr lang="es-PA" dirty="0"/>
           </a:p>
@@ -5710,7 +5760,7 @@
           <a:p>
             <a:fld id="{1A88BB4D-1961-40E1-9ABD-99BD09E9F411}" type="datetimeFigureOut">
               <a:rPr lang="es-PA" smtClean="0"/>
-              <a:t>04/13/2024</a:t>
+              <a:t>04/16/2024</a:t>
             </a:fld>
             <a:endParaRPr lang="es-PA" dirty="0"/>
           </a:p>
@@ -5910,7 +5960,7 @@
           <a:p>
             <a:fld id="{1A88BB4D-1961-40E1-9ABD-99BD09E9F411}" type="datetimeFigureOut">
               <a:rPr lang="es-PA" smtClean="0"/>
-              <a:t>04/13/2024</a:t>
+              <a:t>04/16/2024</a:t>
             </a:fld>
             <a:endParaRPr lang="es-PA" dirty="0"/>
           </a:p>
@@ -6186,7 +6236,7 @@
           <a:p>
             <a:fld id="{1A88BB4D-1961-40E1-9ABD-99BD09E9F411}" type="datetimeFigureOut">
               <a:rPr lang="es-PA" smtClean="0"/>
-              <a:t>04/13/2024</a:t>
+              <a:t>04/16/2024</a:t>
             </a:fld>
             <a:endParaRPr lang="es-PA" dirty="0"/>
           </a:p>
@@ -6454,7 +6504,7 @@
           <a:p>
             <a:fld id="{1A88BB4D-1961-40E1-9ABD-99BD09E9F411}" type="datetimeFigureOut">
               <a:rPr lang="es-PA" smtClean="0"/>
-              <a:t>04/13/2024</a:t>
+              <a:t>04/16/2024</a:t>
             </a:fld>
             <a:endParaRPr lang="es-PA" dirty="0"/>
           </a:p>
@@ -6869,7 +6919,7 @@
           <a:p>
             <a:fld id="{1A88BB4D-1961-40E1-9ABD-99BD09E9F411}" type="datetimeFigureOut">
               <a:rPr lang="es-PA" smtClean="0"/>
-              <a:t>04/13/2024</a:t>
+              <a:t>04/16/2024</a:t>
             </a:fld>
             <a:endParaRPr lang="es-PA" dirty="0"/>
           </a:p>
@@ -7011,7 +7061,7 @@
           <a:p>
             <a:fld id="{1A88BB4D-1961-40E1-9ABD-99BD09E9F411}" type="datetimeFigureOut">
               <a:rPr lang="es-PA" smtClean="0"/>
-              <a:t>04/13/2024</a:t>
+              <a:t>04/16/2024</a:t>
             </a:fld>
             <a:endParaRPr lang="es-PA" dirty="0"/>
           </a:p>
@@ -7124,7 +7174,7 @@
           <a:p>
             <a:fld id="{1A88BB4D-1961-40E1-9ABD-99BD09E9F411}" type="datetimeFigureOut">
               <a:rPr lang="es-PA" smtClean="0"/>
-              <a:t>04/13/2024</a:t>
+              <a:t>04/16/2024</a:t>
             </a:fld>
             <a:endParaRPr lang="es-PA" dirty="0"/>
           </a:p>
@@ -7437,7 +7487,7 @@
           <a:p>
             <a:fld id="{1A88BB4D-1961-40E1-9ABD-99BD09E9F411}" type="datetimeFigureOut">
               <a:rPr lang="es-PA" smtClean="0"/>
-              <a:t>04/13/2024</a:t>
+              <a:t>04/16/2024</a:t>
             </a:fld>
             <a:endParaRPr lang="es-PA" dirty="0"/>
           </a:p>
@@ -7726,7 +7776,7 @@
           <a:p>
             <a:fld id="{1A88BB4D-1961-40E1-9ABD-99BD09E9F411}" type="datetimeFigureOut">
               <a:rPr lang="es-PA" smtClean="0"/>
-              <a:t>04/13/2024</a:t>
+              <a:t>04/16/2024</a:t>
             </a:fld>
             <a:endParaRPr lang="es-PA" dirty="0"/>
           </a:p>
@@ -7978,7 +8028,7 @@
           <a:p>
             <a:fld id="{1A88BB4D-1961-40E1-9ABD-99BD09E9F411}" type="datetimeFigureOut">
               <a:rPr lang="es-PA" smtClean="0"/>
-              <a:t>04/13/2024</a:t>
+              <a:t>04/16/2024</a:t>
             </a:fld>
             <a:endParaRPr lang="es-PA" dirty="0"/>
           </a:p>
@@ -18405,10 +18455,10 @@
       </p:sp>
       <p:pic>
         <p:nvPicPr>
-          <p:cNvPr id="4" name="Picture 3">
-            <a:extLst>
-              <a:ext uri="{FF2B5EF4-FFF2-40B4-BE49-F238E27FC236}">
-                <a16:creationId xmlns:a16="http://schemas.microsoft.com/office/drawing/2014/main" id="{2DB4A7E4-D738-8D4B-DDCC-09E5EC79FE0A}"/>
+          <p:cNvPr id="6" name="Picture 5" descr="A diagram of a server&#10;&#10;Description automatically generated">
+            <a:extLst>
+              <a:ext uri="{FF2B5EF4-FFF2-40B4-BE49-F238E27FC236}">
+                <a16:creationId xmlns:a16="http://schemas.microsoft.com/office/drawing/2014/main" id="{8B0B03D2-BA93-47DF-FE77-CDB996E1B333}"/>
               </a:ext>
             </a:extLst>
           </p:cNvPr>
@@ -18418,7 +18468,7 @@
           <p:nvPr/>
         </p:nvPicPr>
         <p:blipFill>
-          <a:blip r:embed="rId3" cstate="print">
+          <a:blip r:embed="rId3">
             <a:extLst>
               <a:ext uri="{28A0092B-C50C-407E-A947-70E740481C1C}">
                 <a14:useLocalDpi xmlns:a14="http://schemas.microsoft.com/office/drawing/2010/main" val="0"/>
@@ -18431,66 +18481,14 @@
         </p:blipFill>
         <p:spPr>
           <a:xfrm>
-            <a:off x="1855044" y="1717040"/>
-            <a:ext cx="8481912" cy="4460240"/>
+            <a:off x="2000250" y="1690688"/>
+            <a:ext cx="8191500" cy="4857750"/>
           </a:xfrm>
           <a:prstGeom prst="rect">
             <a:avLst/>
           </a:prstGeom>
         </p:spPr>
       </p:pic>
-      <p:sp>
-        <p:nvSpPr>
-          <p:cNvPr id="5" name="Rectangle 4">
-            <a:extLst>
-              <a:ext uri="{FF2B5EF4-FFF2-40B4-BE49-F238E27FC236}">
-                <a16:creationId xmlns:a16="http://schemas.microsoft.com/office/drawing/2014/main" id="{CD88966B-AF32-8B4D-A443-E14F789ABB47}"/>
-              </a:ext>
-            </a:extLst>
-          </p:cNvPr>
-          <p:cNvSpPr/>
-          <p:nvPr/>
-        </p:nvSpPr>
-        <p:spPr>
-          <a:xfrm>
-            <a:off x="5252720" y="2580640"/>
-            <a:ext cx="2113280" cy="1056640"/>
-          </a:xfrm>
-          <a:prstGeom prst="rect">
-            <a:avLst/>
-          </a:prstGeom>
-          <a:noFill/>
-          <a:ln w="38100">
-            <a:solidFill>
-              <a:srgbClr val="FF0000"/>
-            </a:solidFill>
-          </a:ln>
-        </p:spPr>
-        <p:style>
-          <a:lnRef idx="2">
-            <a:schemeClr val="accent1">
-              <a:shade val="15000"/>
-            </a:schemeClr>
-          </a:lnRef>
-          <a:fillRef idx="1">
-            <a:schemeClr val="accent1"/>
-          </a:fillRef>
-          <a:effectRef idx="0">
-            <a:schemeClr val="accent1"/>
-          </a:effectRef>
-          <a:fontRef idx="minor">
-            <a:schemeClr val="lt1"/>
-          </a:fontRef>
-        </p:style>
-        <p:txBody>
-          <a:bodyPr rtlCol="0" anchor="ctr"/>
-          <a:lstStyle/>
-          <a:p>
-            <a:pPr algn="ctr"/>
-            <a:endParaRPr lang="es-PA"/>
-          </a:p>
-        </p:txBody>
-      </p:sp>
     </p:spTree>
     <p:extLst>
       <p:ext uri="{BB962C8B-B14F-4D97-AF65-F5344CB8AC3E}">

</xml_diff>